<commit_message>
pass function into arguement
Pass the two different function names and return the new funciton
</commit_message>
<xml_diff>
--- a/35_HOC3.pptx
+++ b/35_HOC3.pptx
@@ -5496,7 +5496,7 @@
         </p:nvSpPr>
         <p:spPr>
           <a:xfrm>
-            <a:off x="7308304" y="2060848"/>
+            <a:off x="7380312" y="1987141"/>
             <a:ext cx="1048525" cy="216024"/>
           </a:xfrm>
           <a:prstGeom prst="rect">
@@ -7908,8 +7908,8 @@
         </p:nvCxnSpPr>
         <p:spPr>
           <a:xfrm flipV="1">
-            <a:off x="5278430" y="3441737"/>
-            <a:ext cx="837752" cy="1030648"/>
+            <a:off x="5278430" y="3665996"/>
+            <a:ext cx="837752" cy="806389"/>
           </a:xfrm>
           <a:prstGeom prst="straightConnector1">
             <a:avLst/>
@@ -7954,8 +7954,8 @@
         </p:nvCxnSpPr>
         <p:spPr>
           <a:xfrm flipV="1">
-            <a:off x="5278429" y="3441737"/>
-            <a:ext cx="837753" cy="3024835"/>
+            <a:off x="5278429" y="3665996"/>
+            <a:ext cx="837753" cy="2800576"/>
           </a:xfrm>
           <a:prstGeom prst="straightConnector1">
             <a:avLst/>
@@ -7997,7 +7997,7 @@
         <p:spPr>
           <a:xfrm>
             <a:off x="6116182" y="3209361"/>
-            <a:ext cx="2135652" cy="464751"/>
+            <a:ext cx="2135652" cy="913270"/>
           </a:xfrm>
           <a:prstGeom prst="rect">
             <a:avLst/>
@@ -8048,8 +8048,8 @@
         </p:nvSpPr>
         <p:spPr>
           <a:xfrm>
-            <a:off x="6201198" y="5153801"/>
-            <a:ext cx="2590499" cy="1016369"/>
+            <a:off x="6023313" y="5994211"/>
+            <a:ext cx="2219457" cy="824222"/>
           </a:xfrm>
           <a:prstGeom prst="rect">
             <a:avLst/>
@@ -8152,6 +8152,416 @@
           </a:p>
         </p:txBody>
       </p:sp>
+      <p:sp>
+        <p:nvSpPr>
+          <p:cNvPr id="11" name="Rectangle 10">
+            <a:extLst>
+              <a:ext uri="{FF2B5EF4-FFF2-40B4-BE49-F238E27FC236}">
+                <a16:creationId xmlns:a16="http://schemas.microsoft.com/office/drawing/2014/main" id="{CF2E4FD8-8E13-436C-A8FB-41076D833CD6}"/>
+              </a:ext>
+            </a:extLst>
+          </p:cNvPr>
+          <p:cNvSpPr/>
+          <p:nvPr/>
+        </p:nvSpPr>
+        <p:spPr>
+          <a:xfrm>
+            <a:off x="7524328" y="3212976"/>
+            <a:ext cx="576064" cy="144016"/>
+          </a:xfrm>
+          <a:prstGeom prst="rect">
+            <a:avLst/>
+          </a:prstGeom>
+          <a:noFill/>
+        </p:spPr>
+        <p:style>
+          <a:lnRef idx="2">
+            <a:schemeClr val="accent1">
+              <a:shade val="50000"/>
+            </a:schemeClr>
+          </a:lnRef>
+          <a:fillRef idx="1">
+            <a:schemeClr val="accent1"/>
+          </a:fillRef>
+          <a:effectRef idx="0">
+            <a:schemeClr val="accent1"/>
+          </a:effectRef>
+          <a:fontRef idx="minor">
+            <a:schemeClr val="lt1"/>
+          </a:fontRef>
+        </p:style>
+        <p:txBody>
+          <a:bodyPr rtlCol="0" anchor="ctr"/>
+          <a:lstStyle/>
+          <a:p>
+            <a:pPr algn="ctr"/>
+            <a:endParaRPr lang="en-US"/>
+          </a:p>
+        </p:txBody>
+      </p:sp>
+      <p:sp>
+        <p:nvSpPr>
+          <p:cNvPr id="21" name="Rectangle 20">
+            <a:extLst>
+              <a:ext uri="{FF2B5EF4-FFF2-40B4-BE49-F238E27FC236}">
+                <a16:creationId xmlns:a16="http://schemas.microsoft.com/office/drawing/2014/main" id="{ACCFAC27-89A8-422B-B004-9486B17FF5E6}"/>
+              </a:ext>
+            </a:extLst>
+          </p:cNvPr>
+          <p:cNvSpPr/>
+          <p:nvPr/>
+        </p:nvSpPr>
+        <p:spPr>
+          <a:xfrm>
+            <a:off x="7892595" y="4270262"/>
+            <a:ext cx="576064" cy="144016"/>
+          </a:xfrm>
+          <a:prstGeom prst="rect">
+            <a:avLst/>
+          </a:prstGeom>
+          <a:noFill/>
+        </p:spPr>
+        <p:style>
+          <a:lnRef idx="2">
+            <a:schemeClr val="accent1">
+              <a:shade val="50000"/>
+            </a:schemeClr>
+          </a:lnRef>
+          <a:fillRef idx="1">
+            <a:schemeClr val="accent1"/>
+          </a:fillRef>
+          <a:effectRef idx="0">
+            <a:schemeClr val="accent1"/>
+          </a:effectRef>
+          <a:fontRef idx="minor">
+            <a:schemeClr val="lt1"/>
+          </a:fontRef>
+        </p:style>
+        <p:txBody>
+          <a:bodyPr rtlCol="0" anchor="ctr"/>
+          <a:lstStyle/>
+          <a:p>
+            <a:pPr algn="ctr"/>
+            <a:endParaRPr lang="en-US"/>
+          </a:p>
+        </p:txBody>
+      </p:sp>
+      <p:cxnSp>
+        <p:nvCxnSpPr>
+          <p:cNvPr id="15" name="Straight Arrow Connector 14">
+            <a:extLst>
+              <a:ext uri="{FF2B5EF4-FFF2-40B4-BE49-F238E27FC236}">
+                <a16:creationId xmlns:a16="http://schemas.microsoft.com/office/drawing/2014/main" id="{5F5428E7-F932-425A-AC69-9841177FD5BF}"/>
+              </a:ext>
+            </a:extLst>
+          </p:cNvPr>
+          <p:cNvCxnSpPr>
+            <a:stCxn id="11" idx="2"/>
+            <a:endCxn id="21" idx="0"/>
+          </p:cNvCxnSpPr>
+          <p:nvPr/>
+        </p:nvCxnSpPr>
+        <p:spPr>
+          <a:xfrm>
+            <a:off x="7812360" y="3356992"/>
+            <a:ext cx="368267" cy="913270"/>
+          </a:xfrm>
+          <a:prstGeom prst="straightConnector1">
+            <a:avLst/>
+          </a:prstGeom>
+          <a:ln>
+            <a:tailEnd type="triangle"/>
+          </a:ln>
+        </p:spPr>
+        <p:style>
+          <a:lnRef idx="1">
+            <a:schemeClr val="accent1"/>
+          </a:lnRef>
+          <a:fillRef idx="0">
+            <a:schemeClr val="accent1"/>
+          </a:fillRef>
+          <a:effectRef idx="0">
+            <a:schemeClr val="accent1"/>
+          </a:effectRef>
+          <a:fontRef idx="minor">
+            <a:schemeClr val="tx1"/>
+          </a:fontRef>
+        </p:style>
+      </p:cxnSp>
+      <p:sp>
+        <p:nvSpPr>
+          <p:cNvPr id="28" name="Rectangle 27">
+            <a:extLst>
+              <a:ext uri="{FF2B5EF4-FFF2-40B4-BE49-F238E27FC236}">
+                <a16:creationId xmlns:a16="http://schemas.microsoft.com/office/drawing/2014/main" id="{3A5964D9-0E99-4FA5-B5C4-453A62C75B7D}"/>
+              </a:ext>
+            </a:extLst>
+          </p:cNvPr>
+          <p:cNvSpPr/>
+          <p:nvPr/>
+        </p:nvSpPr>
+        <p:spPr>
+          <a:xfrm>
+            <a:off x="6607944" y="3615818"/>
+            <a:ext cx="772368" cy="389245"/>
+          </a:xfrm>
+          <a:prstGeom prst="rect">
+            <a:avLst/>
+          </a:prstGeom>
+          <a:noFill/>
+        </p:spPr>
+        <p:style>
+          <a:lnRef idx="2">
+            <a:schemeClr val="accent1">
+              <a:shade val="50000"/>
+            </a:schemeClr>
+          </a:lnRef>
+          <a:fillRef idx="1">
+            <a:schemeClr val="accent1"/>
+          </a:fillRef>
+          <a:effectRef idx="0">
+            <a:schemeClr val="accent1"/>
+          </a:effectRef>
+          <a:fontRef idx="minor">
+            <a:schemeClr val="lt1"/>
+          </a:fontRef>
+        </p:style>
+        <p:txBody>
+          <a:bodyPr rtlCol="0" anchor="ctr"/>
+          <a:lstStyle/>
+          <a:p>
+            <a:pPr algn="ctr"/>
+            <a:endParaRPr lang="en-US"/>
+          </a:p>
+        </p:txBody>
+      </p:sp>
+      <p:sp>
+        <p:nvSpPr>
+          <p:cNvPr id="30" name="Rectangle 29">
+            <a:extLst>
+              <a:ext uri="{FF2B5EF4-FFF2-40B4-BE49-F238E27FC236}">
+                <a16:creationId xmlns:a16="http://schemas.microsoft.com/office/drawing/2014/main" id="{E249053A-1F0C-4CCF-9BFC-435623B4A95D}"/>
+              </a:ext>
+            </a:extLst>
+          </p:cNvPr>
+          <p:cNvSpPr/>
+          <p:nvPr/>
+        </p:nvSpPr>
+        <p:spPr>
+          <a:xfrm>
+            <a:off x="7133041" y="4973724"/>
+            <a:ext cx="576064" cy="122312"/>
+          </a:xfrm>
+          <a:prstGeom prst="rect">
+            <a:avLst/>
+          </a:prstGeom>
+          <a:noFill/>
+        </p:spPr>
+        <p:style>
+          <a:lnRef idx="2">
+            <a:schemeClr val="accent1">
+              <a:shade val="50000"/>
+            </a:schemeClr>
+          </a:lnRef>
+          <a:fillRef idx="1">
+            <a:schemeClr val="accent1"/>
+          </a:fillRef>
+          <a:effectRef idx="0">
+            <a:schemeClr val="accent1"/>
+          </a:effectRef>
+          <a:fontRef idx="minor">
+            <a:schemeClr val="lt1"/>
+          </a:fontRef>
+        </p:style>
+        <p:txBody>
+          <a:bodyPr rtlCol="0" anchor="ctr"/>
+          <a:lstStyle/>
+          <a:p>
+            <a:pPr algn="ctr"/>
+            <a:endParaRPr lang="en-US"/>
+          </a:p>
+        </p:txBody>
+      </p:sp>
+      <p:cxnSp>
+        <p:nvCxnSpPr>
+          <p:cNvPr id="31" name="Straight Arrow Connector 30">
+            <a:extLst>
+              <a:ext uri="{FF2B5EF4-FFF2-40B4-BE49-F238E27FC236}">
+                <a16:creationId xmlns:a16="http://schemas.microsoft.com/office/drawing/2014/main" id="{450D9D8B-3177-4557-9D7F-E26BDC9D07EB}"/>
+              </a:ext>
+            </a:extLst>
+          </p:cNvPr>
+          <p:cNvCxnSpPr>
+            <a:cxnSpLocks/>
+            <a:stCxn id="28" idx="2"/>
+            <a:endCxn id="30" idx="0"/>
+          </p:cNvCxnSpPr>
+          <p:nvPr/>
+        </p:nvCxnSpPr>
+        <p:spPr>
+          <a:xfrm>
+            <a:off x="6994128" y="4005063"/>
+            <a:ext cx="426945" cy="968661"/>
+          </a:xfrm>
+          <a:prstGeom prst="straightConnector1">
+            <a:avLst/>
+          </a:prstGeom>
+          <a:ln>
+            <a:tailEnd type="triangle"/>
+          </a:ln>
+        </p:spPr>
+        <p:style>
+          <a:lnRef idx="1">
+            <a:schemeClr val="accent1"/>
+          </a:lnRef>
+          <a:fillRef idx="0">
+            <a:schemeClr val="accent1"/>
+          </a:fillRef>
+          <a:effectRef idx="0">
+            <a:schemeClr val="accent1"/>
+          </a:effectRef>
+          <a:fontRef idx="minor">
+            <a:schemeClr val="tx1"/>
+          </a:fontRef>
+        </p:style>
+      </p:cxnSp>
+      <p:sp>
+        <p:nvSpPr>
+          <p:cNvPr id="35" name="Rectangle 34">
+            <a:extLst>
+              <a:ext uri="{FF2B5EF4-FFF2-40B4-BE49-F238E27FC236}">
+                <a16:creationId xmlns:a16="http://schemas.microsoft.com/office/drawing/2014/main" id="{F153BF9A-AD45-4F01-BE7B-D0A3C936593F}"/>
+              </a:ext>
+            </a:extLst>
+          </p:cNvPr>
+          <p:cNvSpPr/>
+          <p:nvPr/>
+        </p:nvSpPr>
+        <p:spPr>
+          <a:xfrm>
+            <a:off x="7421923" y="5081962"/>
+            <a:ext cx="758703" cy="122312"/>
+          </a:xfrm>
+          <a:prstGeom prst="rect">
+            <a:avLst/>
+          </a:prstGeom>
+          <a:noFill/>
+        </p:spPr>
+        <p:style>
+          <a:lnRef idx="2">
+            <a:schemeClr val="accent1">
+              <a:shade val="50000"/>
+            </a:schemeClr>
+          </a:lnRef>
+          <a:fillRef idx="1">
+            <a:schemeClr val="accent1"/>
+          </a:fillRef>
+          <a:effectRef idx="0">
+            <a:schemeClr val="accent1"/>
+          </a:effectRef>
+          <a:fontRef idx="minor">
+            <a:schemeClr val="lt1"/>
+          </a:fontRef>
+        </p:style>
+        <p:txBody>
+          <a:bodyPr rtlCol="0" anchor="ctr"/>
+          <a:lstStyle/>
+          <a:p>
+            <a:pPr algn="ctr"/>
+            <a:endParaRPr lang="en-US"/>
+          </a:p>
+        </p:txBody>
+      </p:sp>
+      <p:sp>
+        <p:nvSpPr>
+          <p:cNvPr id="36" name="Rectangle 35">
+            <a:extLst>
+              <a:ext uri="{FF2B5EF4-FFF2-40B4-BE49-F238E27FC236}">
+                <a16:creationId xmlns:a16="http://schemas.microsoft.com/office/drawing/2014/main" id="{143361BA-4C24-413C-A3C0-A8CADFA35606}"/>
+              </a:ext>
+            </a:extLst>
+          </p:cNvPr>
+          <p:cNvSpPr/>
+          <p:nvPr/>
+        </p:nvSpPr>
+        <p:spPr>
+          <a:xfrm>
+            <a:off x="6456324" y="4143390"/>
+            <a:ext cx="758327" cy="144016"/>
+          </a:xfrm>
+          <a:prstGeom prst="rect">
+            <a:avLst/>
+          </a:prstGeom>
+          <a:noFill/>
+        </p:spPr>
+        <p:style>
+          <a:lnRef idx="2">
+            <a:schemeClr val="accent1">
+              <a:shade val="50000"/>
+            </a:schemeClr>
+          </a:lnRef>
+          <a:fillRef idx="1">
+            <a:schemeClr val="accent1"/>
+          </a:fillRef>
+          <a:effectRef idx="0">
+            <a:schemeClr val="accent1"/>
+          </a:effectRef>
+          <a:fontRef idx="minor">
+            <a:schemeClr val="lt1"/>
+          </a:fontRef>
+        </p:style>
+        <p:txBody>
+          <a:bodyPr rtlCol="0" anchor="ctr"/>
+          <a:lstStyle/>
+          <a:p>
+            <a:pPr algn="ctr"/>
+            <a:endParaRPr lang="en-US"/>
+          </a:p>
+        </p:txBody>
+      </p:sp>
+      <p:cxnSp>
+        <p:nvCxnSpPr>
+          <p:cNvPr id="37" name="Straight Arrow Connector 36">
+            <a:extLst>
+              <a:ext uri="{FF2B5EF4-FFF2-40B4-BE49-F238E27FC236}">
+                <a16:creationId xmlns:a16="http://schemas.microsoft.com/office/drawing/2014/main" id="{FC5C50DE-B9DD-4BBC-B873-451A87005273}"/>
+              </a:ext>
+            </a:extLst>
+          </p:cNvPr>
+          <p:cNvCxnSpPr>
+            <a:cxnSpLocks/>
+            <a:stCxn id="36" idx="2"/>
+            <a:endCxn id="35" idx="0"/>
+          </p:cNvCxnSpPr>
+          <p:nvPr/>
+        </p:nvCxnSpPr>
+        <p:spPr>
+          <a:xfrm>
+            <a:off x="6835488" y="4287406"/>
+            <a:ext cx="965787" cy="794556"/>
+          </a:xfrm>
+          <a:prstGeom prst="straightConnector1">
+            <a:avLst/>
+          </a:prstGeom>
+          <a:ln>
+            <a:tailEnd type="triangle"/>
+          </a:ln>
+        </p:spPr>
+        <p:style>
+          <a:lnRef idx="1">
+            <a:schemeClr val="accent1"/>
+          </a:lnRef>
+          <a:fillRef idx="0">
+            <a:schemeClr val="accent1"/>
+          </a:fillRef>
+          <a:effectRef idx="0">
+            <a:schemeClr val="accent1"/>
+          </a:effectRef>
+          <a:fontRef idx="minor">
+            <a:schemeClr val="tx1"/>
+          </a:fontRef>
+        </p:style>
+      </p:cxnSp>
     </p:spTree>
     <p:extLst>
       <p:ext uri="{BB962C8B-B14F-4D97-AF65-F5344CB8AC3E}">
@@ -11256,7 +11666,7 @@
         </p:blipFill>
         <p:spPr>
           <a:xfrm>
-            <a:off x="4644008" y="1989479"/>
+            <a:off x="5181356" y="2015597"/>
             <a:ext cx="3505444" cy="2691245"/>
           </a:xfrm>
           <a:prstGeom prst="rect">
@@ -11291,8 +11701,8 @@
         </p:blipFill>
         <p:spPr>
           <a:xfrm>
-            <a:off x="755575" y="1989479"/>
-            <a:ext cx="3350829" cy="3527753"/>
+            <a:off x="482262" y="1858252"/>
+            <a:ext cx="4464496" cy="4700221"/>
           </a:xfrm>
           <a:prstGeom prst="rect">
             <a:avLst/>
@@ -11919,7 +12329,7 @@
                 </a:solidFill>
                 <a:latin typeface="+mj-lt"/>
               </a:rPr>
-              <a:t>withCouter</a:t>
+              <a:t>withCounter</a:t>
             </a:r>
             <a:r>
               <a:rPr lang="en-US" altLang="zh-TW" sz="1800" dirty="0">
@@ -12149,8 +12559,8 @@
         </p:nvSpPr>
         <p:spPr>
           <a:xfrm>
-            <a:off x="2311706" y="3911558"/>
-            <a:ext cx="2044270" cy="309529"/>
+            <a:off x="2311706" y="3996055"/>
+            <a:ext cx="2044270" cy="153025"/>
           </a:xfrm>
           <a:prstGeom prst="rect">
             <a:avLst/>
@@ -12576,8 +12986,8 @@
         </p:nvSpPr>
         <p:spPr>
           <a:xfrm>
-            <a:off x="6084168" y="1682793"/>
-            <a:ext cx="936104" cy="306047"/>
+            <a:off x="6145035" y="1690891"/>
+            <a:ext cx="936104" cy="288032"/>
           </a:xfrm>
           <a:prstGeom prst="rect">
             <a:avLst/>
@@ -12628,60 +13038,8 @@
         </p:nvSpPr>
         <p:spPr>
           <a:xfrm>
-            <a:off x="6084168" y="4826169"/>
-            <a:ext cx="1152128" cy="187007"/>
-          </a:xfrm>
-          <a:prstGeom prst="rect">
-            <a:avLst/>
-          </a:prstGeom>
-          <a:noFill/>
-          <a:ln>
-            <a:solidFill>
-              <a:srgbClr val="C00000"/>
-            </a:solidFill>
-          </a:ln>
-        </p:spPr>
-        <p:style>
-          <a:lnRef idx="2">
-            <a:schemeClr val="accent1">
-              <a:shade val="50000"/>
-            </a:schemeClr>
-          </a:lnRef>
-          <a:fillRef idx="1">
-            <a:schemeClr val="accent1"/>
-          </a:fillRef>
-          <a:effectRef idx="0">
-            <a:schemeClr val="accent1"/>
-          </a:effectRef>
-          <a:fontRef idx="minor">
-            <a:schemeClr val="lt1"/>
-          </a:fontRef>
-        </p:style>
-        <p:txBody>
-          <a:bodyPr rtlCol="0" anchor="ctr"/>
-          <a:lstStyle/>
-          <a:p>
-            <a:pPr algn="ctr"/>
-            <a:endParaRPr lang="en-US"/>
-          </a:p>
-        </p:txBody>
-      </p:sp>
-      <p:sp>
-        <p:nvSpPr>
-          <p:cNvPr id="12" name="Rectangle 11">
-            <a:extLst>
-              <a:ext uri="{FF2B5EF4-FFF2-40B4-BE49-F238E27FC236}">
-                <a16:creationId xmlns:a16="http://schemas.microsoft.com/office/drawing/2014/main" id="{B187ADA4-6185-4D5F-A2B7-612E160DAEDD}"/>
-              </a:ext>
-            </a:extLst>
-          </p:cNvPr>
-          <p:cNvSpPr/>
-          <p:nvPr/>
-        </p:nvSpPr>
-        <p:spPr>
-          <a:xfrm>
-            <a:off x="5796136" y="4365104"/>
-            <a:ext cx="1296144" cy="199307"/>
+            <a:off x="5652120" y="4293096"/>
+            <a:ext cx="2448272" cy="849035"/>
           </a:xfrm>
           <a:prstGeom prst="rect">
             <a:avLst/>

</xml_diff>